<commit_message>
Need to work more on powerpoint
</commit_message>
<xml_diff>
--- a/Powerpoint/Final Project.pptx
+++ b/Powerpoint/Final Project.pptx
@@ -105,6 +105,11 @@
       </a:defRPr>
     </a:lvl9pPr>
   </p:defaultTextStyle>
+  <p:extLst>
+    <p:ext uri="{EFAFB233-063F-42B5-8137-9DF3F51BA10A}">
+      <p15:sldGuideLst xmlns:p15="http://schemas.microsoft.com/office/powerpoint/2012/main"/>
+    </p:ext>
+  </p:extLst>
 </p:presentation>
 </file>
 
@@ -239,7 +244,7 @@
           <a:p>
             <a:fld id="{BA612F42-9F13-4C3C-B82A-E610602E1EC4}" type="datetimeFigureOut">
               <a:rPr lang="en-US" smtClean="0"/>
-              <a:t>12/17/2013</a:t>
+              <a:t>12/18/2013</a:t>
             </a:fld>
             <a:endParaRPr lang="en-US"/>
           </a:p>
@@ -409,7 +414,7 @@
           <a:p>
             <a:fld id="{BA612F42-9F13-4C3C-B82A-E610602E1EC4}" type="datetimeFigureOut">
               <a:rPr lang="en-US" smtClean="0"/>
-              <a:t>12/17/2013</a:t>
+              <a:t>12/18/2013</a:t>
             </a:fld>
             <a:endParaRPr lang="en-US"/>
           </a:p>
@@ -589,7 +594,7 @@
           <a:p>
             <a:fld id="{BA612F42-9F13-4C3C-B82A-E610602E1EC4}" type="datetimeFigureOut">
               <a:rPr lang="en-US" smtClean="0"/>
-              <a:t>12/17/2013</a:t>
+              <a:t>12/18/2013</a:t>
             </a:fld>
             <a:endParaRPr lang="en-US"/>
           </a:p>
@@ -759,7 +764,7 @@
           <a:p>
             <a:fld id="{BA612F42-9F13-4C3C-B82A-E610602E1EC4}" type="datetimeFigureOut">
               <a:rPr lang="en-US" smtClean="0"/>
-              <a:t>12/17/2013</a:t>
+              <a:t>12/18/2013</a:t>
             </a:fld>
             <a:endParaRPr lang="en-US"/>
           </a:p>
@@ -1005,7 +1010,7 @@
           <a:p>
             <a:fld id="{BA612F42-9F13-4C3C-B82A-E610602E1EC4}" type="datetimeFigureOut">
               <a:rPr lang="en-US" smtClean="0"/>
-              <a:t>12/17/2013</a:t>
+              <a:t>12/18/2013</a:t>
             </a:fld>
             <a:endParaRPr lang="en-US"/>
           </a:p>
@@ -1237,7 +1242,7 @@
           <a:p>
             <a:fld id="{BA612F42-9F13-4C3C-B82A-E610602E1EC4}" type="datetimeFigureOut">
               <a:rPr lang="en-US" smtClean="0"/>
-              <a:t>12/17/2013</a:t>
+              <a:t>12/18/2013</a:t>
             </a:fld>
             <a:endParaRPr lang="en-US"/>
           </a:p>
@@ -1604,7 +1609,7 @@
           <a:p>
             <a:fld id="{BA612F42-9F13-4C3C-B82A-E610602E1EC4}" type="datetimeFigureOut">
               <a:rPr lang="en-US" smtClean="0"/>
-              <a:t>12/17/2013</a:t>
+              <a:t>12/18/2013</a:t>
             </a:fld>
             <a:endParaRPr lang="en-US"/>
           </a:p>
@@ -1722,7 +1727,7 @@
           <a:p>
             <a:fld id="{BA612F42-9F13-4C3C-B82A-E610602E1EC4}" type="datetimeFigureOut">
               <a:rPr lang="en-US" smtClean="0"/>
-              <a:t>12/17/2013</a:t>
+              <a:t>12/18/2013</a:t>
             </a:fld>
             <a:endParaRPr lang="en-US"/>
           </a:p>
@@ -1817,7 +1822,7 @@
           <a:p>
             <a:fld id="{BA612F42-9F13-4C3C-B82A-E610602E1EC4}" type="datetimeFigureOut">
               <a:rPr lang="en-US" smtClean="0"/>
-              <a:t>12/17/2013</a:t>
+              <a:t>12/18/2013</a:t>
             </a:fld>
             <a:endParaRPr lang="en-US"/>
           </a:p>
@@ -2094,7 +2099,7 @@
           <a:p>
             <a:fld id="{BA612F42-9F13-4C3C-B82A-E610602E1EC4}" type="datetimeFigureOut">
               <a:rPr lang="en-US" smtClean="0"/>
-              <a:t>12/17/2013</a:t>
+              <a:t>12/18/2013</a:t>
             </a:fld>
             <a:endParaRPr lang="en-US"/>
           </a:p>
@@ -2347,7 +2352,7 @@
           <a:p>
             <a:fld id="{BA612F42-9F13-4C3C-B82A-E610602E1EC4}" type="datetimeFigureOut">
               <a:rPr lang="en-US" smtClean="0"/>
-              <a:t>12/17/2013</a:t>
+              <a:t>12/18/2013</a:t>
             </a:fld>
             <a:endParaRPr lang="en-US"/>
           </a:p>
@@ -2560,7 +2565,7 @@
           <a:p>
             <a:fld id="{BA612F42-9F13-4C3C-B82A-E610602E1EC4}" type="datetimeFigureOut">
               <a:rPr lang="en-US" smtClean="0"/>
-              <a:t>12/17/2013</a:t>
+              <a:t>12/18/2013</a:t>
             </a:fld>
             <a:endParaRPr lang="en-US"/>
           </a:p>
@@ -3098,6 +3103,13 @@
           </a:p>
           <a:p>
             <a:r>
+              <a:rPr lang="en-US" smtClean="0"/>
+              <a:t>Maze Generator</a:t>
+            </a:r>
+            <a:endParaRPr lang="en-US" dirty="0" smtClean="0"/>
+          </a:p>
+          <a:p>
+            <a:r>
               <a:rPr lang="en-US" dirty="0" smtClean="0"/>
               <a:t>Camera</a:t>
             </a:r>
@@ -3111,13 +3123,8 @@
           <a:p>
             <a:r>
               <a:rPr lang="en-US" dirty="0" smtClean="0"/>
-              <a:t>Color </a:t>
-            </a:r>
-            <a:r>
-              <a:rPr lang="en-US" smtClean="0"/>
-              <a:t>and lighting</a:t>
-            </a:r>
-            <a:endParaRPr lang="en-US" dirty="0" smtClean="0"/>
+              <a:t>Color and lighting</a:t>
+            </a:r>
           </a:p>
         </p:txBody>
       </p:sp>

</xml_diff>